<commit_message>
problems with esquisse gif
</commit_message>
<xml_diff>
--- a/QuantMinds2019_PythonMachineLearningVs.pptx
+++ b/QuantMinds2019_PythonMachineLearningVs.pptx
@@ -214,7 +214,7 @@
             <a:fld id="{41C5B043-51DC-41DA-B8C0-DF0653A7819F}" type="datetimeFigureOut">
               <a:rPr lang="en-US" smtClean="0"/>
               <a:pPr/>
-              <a:t>4/25/2019</a:t>
+              <a:t>5/13/2019</a:t>
             </a:fld>
             <a:endParaRPr lang="en-US"/>
           </a:p>
@@ -1426,7 +1426,7 @@
             <a:fld id="{745B244E-841F-415D-A488-BDB8301D8FA5}" type="datetime1">
               <a:rPr lang="en-US" smtClean="0"/>
               <a:pPr/>
-              <a:t>4/25/2019</a:t>
+              <a:t>5/13/2019</a:t>
             </a:fld>
             <a:endParaRPr lang="en-US"/>
           </a:p>
@@ -1593,7 +1593,7 @@
             <a:fld id="{B49A45C4-F403-4AEA-8301-7B96B5360624}" type="datetime1">
               <a:rPr lang="en-US" smtClean="0"/>
               <a:pPr/>
-              <a:t>4/25/2019</a:t>
+              <a:t>5/13/2019</a:t>
             </a:fld>
             <a:endParaRPr lang="en-US"/>
           </a:p>
@@ -1770,7 +1770,7 @@
             <a:fld id="{AC5016D4-466B-4B98-89AC-547E0554C2A7}" type="datetime1">
               <a:rPr lang="en-US" smtClean="0"/>
               <a:pPr/>
-              <a:t>4/25/2019</a:t>
+              <a:t>5/13/2019</a:t>
             </a:fld>
             <a:endParaRPr lang="en-US"/>
           </a:p>
@@ -1937,7 +1937,7 @@
             <a:fld id="{6ADFA516-2EDC-4065-8509-92920F60465A}" type="datetime1">
               <a:rPr lang="en-US" smtClean="0"/>
               <a:pPr/>
-              <a:t>4/25/2019</a:t>
+              <a:t>5/13/2019</a:t>
             </a:fld>
             <a:endParaRPr lang="en-US"/>
           </a:p>
@@ -2180,7 +2180,7 @@
             <a:fld id="{6C2B15D7-DCE7-4709-B96D-BC2C72906E47}" type="datetime1">
               <a:rPr lang="en-US" smtClean="0"/>
               <a:pPr/>
-              <a:t>4/25/2019</a:t>
+              <a:t>5/13/2019</a:t>
             </a:fld>
             <a:endParaRPr lang="en-US"/>
           </a:p>
@@ -2465,7 +2465,7 @@
             <a:fld id="{C0AD0B10-93A2-4884-8151-41783E0A81C1}" type="datetime1">
               <a:rPr lang="en-US" smtClean="0"/>
               <a:pPr/>
-              <a:t>4/25/2019</a:t>
+              <a:t>5/13/2019</a:t>
             </a:fld>
             <a:endParaRPr lang="en-US"/>
           </a:p>
@@ -2884,7 +2884,7 @@
             <a:fld id="{2094BAA5-395F-4C49-9F23-94E5CA488D62}" type="datetime1">
               <a:rPr lang="en-US" smtClean="0"/>
               <a:pPr/>
-              <a:t>4/25/2019</a:t>
+              <a:t>5/13/2019</a:t>
             </a:fld>
             <a:endParaRPr lang="en-US"/>
           </a:p>
@@ -2999,7 +2999,7 @@
             <a:fld id="{0D30672D-8EAA-4CA7-9C11-6D3DCE2160DD}" type="datetime1">
               <a:rPr lang="en-US" smtClean="0"/>
               <a:pPr/>
-              <a:t>4/25/2019</a:t>
+              <a:t>5/13/2019</a:t>
             </a:fld>
             <a:endParaRPr lang="en-US"/>
           </a:p>
@@ -3091,7 +3091,7 @@
             <a:fld id="{56BFAC80-F192-4DA4-9E6D-D8BC8FE969D2}" type="datetime1">
               <a:rPr lang="en-US" smtClean="0"/>
               <a:pPr/>
-              <a:t>4/25/2019</a:t>
+              <a:t>5/13/2019</a:t>
             </a:fld>
             <a:endParaRPr lang="en-US"/>
           </a:p>
@@ -3365,7 +3365,7 @@
             <a:fld id="{09ED51BF-5608-4FD8-814A-BDDF8D07108C}" type="datetime1">
               <a:rPr lang="en-US" smtClean="0"/>
               <a:pPr/>
-              <a:t>4/25/2019</a:t>
+              <a:t>5/13/2019</a:t>
             </a:fld>
             <a:endParaRPr lang="en-US"/>
           </a:p>
@@ -3615,7 +3615,7 @@
             <a:fld id="{0ACF2896-FB12-470F-9DE9-85CA0A480CD9}" type="datetime1">
               <a:rPr lang="en-US" smtClean="0"/>
               <a:pPr/>
-              <a:t>4/25/2019</a:t>
+              <a:t>5/13/2019</a:t>
             </a:fld>
             <a:endParaRPr lang="en-US"/>
           </a:p>
@@ -3825,7 +3825,7 @@
             <a:fld id="{DCDD895B-375E-4E5C-9A10-B3937B35D842}" type="datetime1">
               <a:rPr lang="en-US" smtClean="0"/>
               <a:pPr/>
-              <a:t>4/25/2019</a:t>
+              <a:t>5/13/2019</a:t>
             </a:fld>
             <a:endParaRPr lang="en-US"/>
           </a:p>
@@ -4360,25 +4360,13 @@
           <a:p>
             <a:r>
               <a:rPr lang="en-US" dirty="0" smtClean="0"/>
-              <a:t>Sometimes ggplot2 can </a:t>
-            </a:r>
-            <a:r>
-              <a:rPr lang="en-US" dirty="0" smtClean="0"/>
-              <a:t>be a bit difficult</a:t>
-            </a:r>
-          </a:p>
-          <a:p>
-            <a:r>
-              <a:rPr lang="en-US" dirty="0" smtClean="0"/>
-              <a:t>Use </a:t>
-            </a:r>
-            <a:r>
-              <a:rPr lang="en-US" dirty="0" smtClean="0"/>
-              <a:t>ggplot2 builder </a:t>
-            </a:r>
-            <a:r>
-              <a:rPr lang="en-US" dirty="0" smtClean="0"/>
-              <a:t>(</a:t>
+              <a:t>Sometimes ggplot2 can be a bit difficult</a:t>
+            </a:r>
+          </a:p>
+          <a:p>
+            <a:r>
+              <a:rPr lang="en-US" dirty="0" smtClean="0"/>
+              <a:t>Use ggplot2 builder (</a:t>
             </a:r>
             <a:r>
               <a:rPr lang="en-US" dirty="0" err="1" smtClean="0"/>
@@ -4427,14 +4415,14 @@
       </p:sp>
       <p:pic>
         <p:nvPicPr>
-          <p:cNvPr id="32770" name="Picture 2" descr="esquisse.gif"/>
+          <p:cNvPr id="1026" name="Picture 2" descr="C:\Users\erdem\Documents\code\quantMinds2019\esquisse.gif"/>
           <p:cNvPicPr>
             <a:picLocks noChangeAspect="1" noChangeArrowheads="1" noCrop="1"/>
           </p:cNvPicPr>
           <p:nvPr/>
         </p:nvPicPr>
         <p:blipFill>
-          <a:blip r:embed="rId2" cstate="print"/>
+          <a:blip r:embed="rId2"/>
           <a:srcRect/>
           <a:stretch>
             <a:fillRect/>
@@ -4442,8 +4430,8 @@
         </p:blipFill>
         <p:spPr bwMode="auto">
           <a:xfrm>
-            <a:off x="2428860" y="3214686"/>
-            <a:ext cx="3855720" cy="3044190"/>
+            <a:off x="2500298" y="3143248"/>
+            <a:ext cx="4211623" cy="3325184"/>
           </a:xfrm>
           <a:prstGeom prst="rect">
             <a:avLst/>
@@ -4518,11 +4506,7 @@
             </a:r>
             <a:r>
               <a:rPr lang="en-US" dirty="0" smtClean="0"/>
-              <a:t>, and </a:t>
-            </a:r>
-            <a:r>
-              <a:rPr lang="en-US" dirty="0" smtClean="0"/>
-              <a:t>Pandas (Python)</a:t>
+              <a:t>, and Pandas (Python)</a:t>
             </a:r>
             <a:endParaRPr lang="en-US" dirty="0"/>
           </a:p>
@@ -4562,11 +4546,7 @@
             </a:r>
             <a:r>
               <a:rPr lang="en-US" sz="2000" dirty="0" smtClean="0"/>
-              <a:t> </a:t>
-            </a:r>
-            <a:r>
-              <a:rPr lang="en-US" sz="2000" dirty="0" smtClean="0"/>
-              <a:t>and Pandas plotting were built on top of </a:t>
+              <a:t> and Pandas plotting were built on top of </a:t>
             </a:r>
             <a:r>
               <a:rPr lang="en-US" sz="2000" dirty="0" err="1" smtClean="0"/>
@@ -4965,15 +4945,7 @@
             </a:r>
             <a:r>
               <a:rPr lang="en-US" sz="2000" dirty="0" smtClean="0"/>
-              <a:t>, pandas). For statistical tasks R is more </a:t>
-            </a:r>
-            <a:r>
-              <a:rPr lang="en-US" sz="2000" dirty="0" smtClean="0"/>
-              <a:t>straightforward, this resonates well with not only with regression </a:t>
-            </a:r>
-            <a:r>
-              <a:rPr lang="en-US" sz="2000" dirty="0" smtClean="0"/>
-              <a:t/>
+              <a:t>, pandas). For statistical tasks R is more straightforward, this resonates well with not only with regression </a:t>
             </a:r>
             <a:br>
               <a:rPr lang="en-US" sz="2000" dirty="0" smtClean="0"/>
@@ -4987,19 +4959,7 @@
             </a:r>
             <a:r>
               <a:rPr lang="en-US" sz="2000" dirty="0" smtClean="0"/>
-              <a:t>-learn </a:t>
-            </a:r>
-            <a:r>
-              <a:rPr lang="en-US" sz="2000" dirty="0" smtClean="0"/>
-              <a:t>compares </a:t>
-            </a:r>
-            <a:r>
-              <a:rPr lang="en-US" sz="2000" dirty="0" smtClean="0"/>
-              <a:t>well Caret </a:t>
-            </a:r>
-            <a:r>
-              <a:rPr lang="en-US" sz="2000" dirty="0" smtClean="0"/>
-              <a:t>in R. </a:t>
+              <a:t>-learn compares well Caret in R. </a:t>
             </a:r>
             <a:br>
               <a:rPr lang="en-US" sz="2000" dirty="0" smtClean="0"/>
@@ -5028,11 +4988,7 @@
             </a:br>
             <a:r>
               <a:rPr lang="en-US" sz="2000" dirty="0" smtClean="0"/>
-              <a:t>-Model summaries is a bit better in R as usual, but both libraries are </a:t>
-            </a:r>
-            <a:r>
-              <a:rPr lang="en-US" sz="2000" dirty="0" smtClean="0"/>
-              <a:t>comparable</a:t>
+              <a:t>-Model summaries is a bit better in R as usual, but both libraries are comparable</a:t>
             </a:r>
             <a:endParaRPr lang="en-US" sz="2000" dirty="0"/>
           </a:p>
@@ -5609,84 +5565,23 @@
               <a:rPr lang="en-US" dirty="0" smtClean="0"/>
               <a:t> no doubt is better marketed compared to the other deep learning frameworks</a:t>
             </a:r>
-            <a:endParaRPr lang="en-US" dirty="0" smtClean="0"/>
-          </a:p>
-          <a:p>
-            <a:r>
-              <a:rPr lang="en-US" dirty="0" smtClean="0"/>
-              <a:t>symbolic </a:t>
-            </a:r>
-            <a:r>
-              <a:rPr lang="en-US" dirty="0" smtClean="0"/>
-              <a:t>math library, and is also used for machine learning applications such as neural networks. It is not really </a:t>
-            </a:r>
-            <a:r>
-              <a:rPr lang="en-US" dirty="0" smtClean="0"/>
-              <a:t>a ready set of </a:t>
-            </a:r>
-            <a:r>
-              <a:rPr lang="en-US" dirty="0" smtClean="0"/>
-              <a:t>machine learning </a:t>
-            </a:r>
-            <a:r>
-              <a:rPr lang="en-US" dirty="0" smtClean="0"/>
-              <a:t>algorithms. Primarily a gradient descent optimization tool</a:t>
-            </a:r>
-          </a:p>
-          <a:p>
-            <a:r>
-              <a:rPr lang="en-US" dirty="0" smtClean="0"/>
-              <a:t>deployment of computation across a variety of platforms (CPUs, GPUs, </a:t>
-            </a:r>
-            <a:r>
-              <a:rPr lang="en-US" dirty="0" smtClean="0"/>
-              <a:t>TPUs)</a:t>
-            </a:r>
-          </a:p>
-          <a:p>
-            <a:r>
-              <a:rPr lang="en-US" dirty="0" smtClean="0"/>
-              <a:t>stable </a:t>
-            </a:r>
-            <a:r>
-              <a:rPr lang="en-US" dirty="0" smtClean="0"/>
-              <a:t>Python (for version 3.7 across all </a:t>
-            </a:r>
-            <a:r>
-              <a:rPr lang="en-US" dirty="0" smtClean="0"/>
-              <a:t>platforms and </a:t>
-            </a:r>
-            <a:r>
-              <a:rPr lang="en-US" dirty="0" smtClean="0"/>
-              <a:t>C </a:t>
-            </a:r>
-            <a:r>
-              <a:rPr lang="en-US" dirty="0" smtClean="0"/>
-              <a:t>APIs  </a:t>
-            </a:r>
-            <a:r>
-              <a:rPr lang="en-US" dirty="0" smtClean="0"/>
-              <a:t>and without API backwards compatibility guarantee: C++, Go, </a:t>
-            </a:r>
-            <a:r>
-              <a:rPr lang="en-US" dirty="0" smtClean="0"/>
-              <a:t>Java] JavaScript </a:t>
-            </a:r>
-            <a:r>
-              <a:rPr lang="en-US" dirty="0" smtClean="0"/>
-              <a:t>and </a:t>
-            </a:r>
-            <a:r>
-              <a:rPr lang="en-US" dirty="0" smtClean="0"/>
-              <a:t>Swift. </a:t>
-            </a:r>
-            <a:r>
-              <a:rPr lang="en-US" dirty="0" smtClean="0"/>
-              <a:t>Third-party packages are available for C</a:t>
-            </a:r>
-            <a:r>
-              <a:rPr lang="en-US" dirty="0" smtClean="0"/>
-              <a:t>#, Haskell, Julia, R, </a:t>
+          </a:p>
+          <a:p>
+            <a:r>
+              <a:rPr lang="en-US" dirty="0" smtClean="0"/>
+              <a:t>symbolic math library, and is also used for machine learning applications such as neural networks. It is not really a ready set of machine learning algorithms. Primarily a gradient descent optimization tool</a:t>
+            </a:r>
+          </a:p>
+          <a:p>
+            <a:r>
+              <a:rPr lang="en-US" dirty="0" smtClean="0"/>
+              <a:t>deployment of computation across a variety of platforms (CPUs, GPUs, TPUs)</a:t>
+            </a:r>
+          </a:p>
+          <a:p>
+            <a:r>
+              <a:rPr lang="en-US" dirty="0" smtClean="0"/>
+              <a:t>stable Python (for version 3.7 across all platforms and C APIs  and without API backwards compatibility guarantee: C++, Go, Java] JavaScript and Swift. Third-party packages are available for C#, Haskell, Julia, R, </a:t>
             </a:r>
             <a:r>
               <a:rPr lang="en-US" dirty="0" err="1" smtClean="0"/>
@@ -5702,15 +5597,7 @@
             </a:r>
             <a:r>
               <a:rPr lang="en-US" dirty="0" smtClean="0"/>
-              <a:t>, </a:t>
-            </a:r>
-            <a:r>
-              <a:rPr lang="en-US" dirty="0" smtClean="0"/>
-              <a:t>and </a:t>
-            </a:r>
-            <a:r>
-              <a:rPr lang="en-US" dirty="0" smtClean="0"/>
-              <a:t>Crystal. </a:t>
+              <a:t>, and Crystal. </a:t>
             </a:r>
           </a:p>
           <a:p>
@@ -5852,11 +5739,7 @@
             </a:r>
             <a:r>
               <a:rPr lang="en-US" dirty="0" smtClean="0"/>
-              <a:t> </a:t>
-            </a:r>
-            <a:r>
-              <a:rPr lang="en-US" dirty="0" smtClean="0"/>
-              <a:t>a user friendly way to access since you can build neural nets one layer at a time. You don’t need to spend several lines of codes of </a:t>
+              <a:t> a user friendly way to access since you can build neural nets one layer at a time. You don’t need to spend several lines of codes of </a:t>
             </a:r>
             <a:r>
               <a:rPr lang="en-US" dirty="0" err="1" smtClean="0"/>
@@ -5896,11 +5779,7 @@
             </a:pPr>
             <a:r>
               <a:rPr lang="en-US" dirty="0" smtClean="0"/>
-              <a:t>Define </a:t>
-            </a:r>
-            <a:r>
-              <a:rPr lang="en-US" dirty="0" smtClean="0"/>
-              <a:t>your model. Create a sequence and add layers.</a:t>
+              <a:t>Define your model. Create a sequence and add layers.</a:t>
             </a:r>
             <a:br>
               <a:rPr lang="en-US" dirty="0" smtClean="0"/>
@@ -5909,7 +5788,6 @@
               <a:rPr lang="en-US" dirty="0" smtClean="0"/>
               <a:t>        </a:t>
             </a:r>
-            <a:endParaRPr lang="en-US" dirty="0" smtClean="0"/>
           </a:p>
           <a:p>
             <a:pPr marL="971550" lvl="1" indent="-514350">
@@ -5918,11 +5796,7 @@
             </a:pPr>
             <a:r>
               <a:rPr lang="en-US" dirty="0" smtClean="0"/>
-              <a:t>Compile </a:t>
-            </a:r>
-            <a:r>
-              <a:rPr lang="en-US" dirty="0" smtClean="0"/>
-              <a:t>your model. Specify loss functions and optimizers.</a:t>
+              <a:t>Compile your model. Specify loss functions and optimizers.</a:t>
             </a:r>
             <a:br>
               <a:rPr lang="en-US" dirty="0" smtClean="0"/>
@@ -5931,7 +5805,6 @@
               <a:rPr lang="en-US" dirty="0" smtClean="0"/>
               <a:t>        </a:t>
             </a:r>
-            <a:endParaRPr lang="en-US" dirty="0" smtClean="0"/>
           </a:p>
           <a:p>
             <a:pPr marL="971550" lvl="1" indent="-514350">
@@ -5940,11 +5813,7 @@
             </a:pPr>
             <a:r>
               <a:rPr lang="en-US" dirty="0" smtClean="0"/>
-              <a:t>Fit </a:t>
-            </a:r>
-            <a:r>
-              <a:rPr lang="en-US" dirty="0" smtClean="0"/>
-              <a:t>your model. Execute the model using data.</a:t>
+              <a:t>Fit your model. Execute the model using data.</a:t>
             </a:r>
             <a:br>
               <a:rPr lang="en-US" dirty="0" smtClean="0"/>
@@ -5953,7 +5822,6 @@
               <a:rPr lang="en-US" dirty="0" smtClean="0"/>
               <a:t>        </a:t>
             </a:r>
-            <a:endParaRPr lang="en-US" dirty="0" smtClean="0"/>
           </a:p>
           <a:p>
             <a:pPr marL="971550" lvl="1" indent="-514350">
@@ -5962,11 +5830,7 @@
             </a:pPr>
             <a:r>
               <a:rPr lang="en-US" dirty="0" smtClean="0"/>
-              <a:t>Make </a:t>
-            </a:r>
-            <a:r>
-              <a:rPr lang="en-US" dirty="0" smtClean="0"/>
-              <a:t>predictions. Use the model to generate predictions on new data.</a:t>
+              <a:t>Make predictions. Use the model to generate predictions on new data.</a:t>
             </a:r>
             <a:endParaRPr lang="en-US" dirty="0"/>
           </a:p>
@@ -6063,30 +5927,14 @@
           <a:p>
             <a:r>
               <a:rPr lang="en-US" dirty="0" smtClean="0"/>
-              <a:t>H20 </a:t>
-            </a:r>
-            <a:r>
-              <a:rPr lang="en-US" dirty="0" smtClean="0"/>
-              <a:t>is java based (available through R  and Python</a:t>
-            </a:r>
-            <a:r>
-              <a:rPr lang="en-US" dirty="0" smtClean="0"/>
-              <a:t>)</a:t>
+              <a:t>H20 is java based (available through R  and Python)</a:t>
             </a:r>
             <a:br>
               <a:rPr lang="en-US" dirty="0" smtClean="0"/>
             </a:br>
             <a:r>
               <a:rPr lang="en-US" dirty="0" smtClean="0"/>
-              <a:t>the primary purpose of H2O is as a distributed (many machines), parallel (many CPUs), in memory (several hundred </a:t>
-            </a:r>
-            <a:r>
-              <a:rPr lang="en-US" dirty="0" smtClean="0"/>
-              <a:t>GBs) </a:t>
-            </a:r>
-            <a:r>
-              <a:rPr lang="en-US" dirty="0" smtClean="0"/>
-              <a:t>processing engine.</a:t>
+              <a:t>the primary purpose of H2O is as a distributed (many machines), parallel (many CPUs), in memory (several hundred GBs) processing engine.</a:t>
             </a:r>
             <a:br>
               <a:rPr lang="en-US" dirty="0" smtClean="0"/>
@@ -6114,11 +5962,7 @@
             </a:pPr>
             <a:r>
               <a:rPr lang="en-US" dirty="0" smtClean="0"/>
-              <a:t>Access </a:t>
-            </a:r>
-            <a:r>
-              <a:rPr lang="en-US" dirty="0" smtClean="0"/>
-              <a:t>from both R and Python</a:t>
+              <a:t>Access from both R and Python</a:t>
             </a:r>
             <a:br>
               <a:rPr lang="en-US" dirty="0" smtClean="0"/>
@@ -6132,19 +5976,7 @@
             </a:pPr>
             <a:r>
               <a:rPr lang="en-US" dirty="0" smtClean="0"/>
-              <a:t>Access </a:t>
-            </a:r>
-            <a:r>
-              <a:rPr lang="en-US" dirty="0" smtClean="0"/>
-              <a:t>from web-based interface named Flow. By means of Flow, data scientists are able to import, explore, and modify datasets, play with models, verify models performances, and much </a:t>
-            </a:r>
-            <a:r>
-              <a:rPr lang="en-US" dirty="0" smtClean="0"/>
-              <a:t>more.</a:t>
-            </a:r>
-            <a:r>
-              <a:rPr lang="en-US" dirty="0" smtClean="0"/>
-              <a:t/>
+              <a:t>Access from web-based interface named Flow. By means of Flow, data scientists are able to import, explore, and modify datasets, play with models, verify models performances, and much more.</a:t>
             </a:r>
             <a:br>
               <a:rPr lang="en-US" dirty="0" smtClean="0"/>
@@ -6162,11 +5994,7 @@
             </a:r>
             <a:r>
               <a:rPr lang="en-US" dirty="0" smtClean="0"/>
-              <a:t> </a:t>
-            </a:r>
-            <a:r>
-              <a:rPr lang="en-US" dirty="0" smtClean="0"/>
-              <a:t>: automatic training and tuning of many models within a user-specified time-limit.</a:t>
+              <a:t> : automatic training and tuning of many models within a user-specified time-limit.</a:t>
             </a:r>
             <a:br>
               <a:rPr lang="en-US" dirty="0" smtClean="0"/>
@@ -6180,11 +6008,7 @@
             </a:pPr>
             <a:r>
               <a:rPr lang="en-US" dirty="0" smtClean="0"/>
-              <a:t>Distributed</a:t>
-            </a:r>
-            <a:r>
-              <a:rPr lang="en-US" dirty="0" smtClean="0"/>
-              <a:t>, In-memory processing : In-memory processing with fast serialization between nodes and clusters to support massive datasets.</a:t>
+              <a:t>Distributed, In-memory processing : In-memory processing with fast serialization between nodes and clusters to support massive datasets.</a:t>
             </a:r>
             <a:br>
               <a:rPr lang="en-US" dirty="0" smtClean="0"/>
@@ -6198,11 +6022,7 @@
             </a:pPr>
             <a:r>
               <a:rPr lang="en-US" dirty="0" smtClean="0"/>
-              <a:t>Simple </a:t>
-            </a:r>
-            <a:r>
-              <a:rPr lang="en-US" dirty="0" smtClean="0"/>
-              <a:t>Deployment : Easy to deploy POJOs/MOJOs (java model object files) to deploy models for fast and accurate scoring in any environment, including with very large models.</a:t>
+              <a:t>Simple Deployment : Easy to deploy POJOs/MOJOs (java model object files) to deploy models for fast and accurate scoring in any environment, including with very large models.</a:t>
             </a:r>
             <a:br>
               <a:rPr lang="en-US" dirty="0" smtClean="0"/>
@@ -6340,11 +6160,7 @@
           <a:p>
             <a:r>
               <a:rPr lang="en-US" dirty="0" smtClean="0"/>
-              <a:t>Spark is a unified, one-stop-shop for working with Big Data — “Spark is designed to support a wide range of data analytics tasks, ranging from simple data loading and SQL queries to machine learning and streaming computation, over the same computing engine and with a consistent set of APIs</a:t>
-            </a:r>
-            <a:r>
-              <a:rPr lang="en-US" dirty="0" smtClean="0"/>
-              <a:t>.</a:t>
+              <a:t>Spark is a unified, one-stop-shop for working with Big Data — “Spark is designed to support a wide range of data analytics tasks, ranging from simple data loading and SQL queries to machine learning and streaming computation, over the same computing engine and with a consistent set of APIs.</a:t>
             </a:r>
           </a:p>
           <a:p>
@@ -6358,11 +6174,7 @@
             </a:r>
             <a:r>
               <a:rPr lang="en-US" dirty="0" smtClean="0"/>
-              <a:t> involves more reading and writing from disk</a:t>
-            </a:r>
-            <a:r>
-              <a:rPr lang="en-US" dirty="0" smtClean="0"/>
-              <a:t>.</a:t>
+              <a:t> involves more reading and writing from disk.</a:t>
             </a:r>
           </a:p>
           <a:p>
@@ -6376,11 +6188,7 @@
             </a:r>
             <a:r>
               <a:rPr lang="en-US" dirty="0" smtClean="0"/>
-              <a:t> object in the driver </a:t>
-            </a:r>
-            <a:r>
-              <a:rPr lang="en-US" dirty="0" smtClean="0"/>
-              <a:t>program.</a:t>
+              <a:t> object in the driver program.</a:t>
             </a:r>
           </a:p>
           <a:p>
@@ -6517,33 +6325,13 @@
           <a:p>
             <a:r>
               <a:rPr lang="en-US" sz="3400" dirty="0" smtClean="0"/>
-              <a:t>Uses Java </a:t>
-            </a:r>
+              <a:t>Uses Java Virtual Machine (JVM) during runtime which gives is some speed over Python in most cases.  Python is dynamically typed and this reduces the speed </a:t>
+            </a:r>
+          </a:p>
+          <a:p>
             <a:r>
               <a:rPr lang="en-US" sz="3400" dirty="0" smtClean="0"/>
-              <a:t>Virtual Machine (JVM) during runtime which gives is some speed over Python in most </a:t>
-            </a:r>
-            <a:r>
-              <a:rPr lang="en-US" sz="3400" dirty="0" smtClean="0"/>
-              <a:t>cases.</a:t>
-            </a:r>
-            <a:r>
-              <a:rPr lang="en-US" sz="3400" dirty="0" smtClean="0"/>
-              <a:t>  Python is dynamically typed and this reduces the </a:t>
-            </a:r>
-            <a:r>
-              <a:rPr lang="en-US" sz="3400" dirty="0" smtClean="0"/>
-              <a:t>speed </a:t>
-            </a:r>
-          </a:p>
-          <a:p>
-            <a:r>
-              <a:rPr lang="en-US" sz="3400" dirty="0" smtClean="0"/>
-              <a:t>In </a:t>
-            </a:r>
-            <a:r>
-              <a:rPr lang="en-US" sz="3400" dirty="0" smtClean="0"/>
-              <a:t>case of Python, Spark libraries are called which require a lot of code processing and hence slower performance. In this scenario </a:t>
+              <a:t>In case of Python, Spark libraries are called which require a lot of code processing and hence slower performance. In this scenario </a:t>
             </a:r>
             <a:r>
               <a:rPr lang="en-US" sz="3400" dirty="0" err="1" smtClean="0"/>
@@ -6551,11 +6339,7 @@
             </a:r>
             <a:r>
               <a:rPr lang="en-US" sz="3400" dirty="0" smtClean="0"/>
-              <a:t> works well for limited </a:t>
-            </a:r>
-            <a:r>
-              <a:rPr lang="en-US" sz="3400" dirty="0" smtClean="0"/>
-              <a:t>cores</a:t>
+              <a:t> works well for limited cores</a:t>
             </a:r>
           </a:p>
           <a:p>
@@ -6575,15 +6359,7 @@
             </a:r>
             <a:r>
               <a:rPr lang="en-US" sz="3400" dirty="0" smtClean="0"/>
-              <a:t> </a:t>
-            </a:r>
-            <a:r>
-              <a:rPr lang="en-US" sz="3400" dirty="0" smtClean="0"/>
-              <a:t>allows writing of code with multiple concurrency </a:t>
-            </a:r>
-            <a:r>
-              <a:rPr lang="en-US" sz="3400" dirty="0" smtClean="0"/>
-              <a:t>primitives, whereas  Python does support heavyweight process forking. Here, only one thread is active at a time. So whenever a new code is deployed, more processes must be restarted which increases the memory overhead.</a:t>
+              <a:t> allows writing of code with multiple concurrency primitives, whereas  Python does support heavyweight process forking. Here, only one thread is active at a time. So whenever a new code is deployed, more processes must be restarted which increases the memory overhead.</a:t>
             </a:r>
           </a:p>
           <a:p>
@@ -6593,23 +6369,7 @@
             </a:r>
             <a:r>
               <a:rPr lang="en-US" sz="3400" dirty="0" smtClean="0"/>
-              <a:t> does not have great support for ML libraries example NLP</a:t>
-            </a:r>
-            <a:r>
-              <a:rPr lang="en-US" sz="3400" dirty="0" smtClean="0"/>
-              <a:t>, Python is </a:t>
-            </a:r>
-            <a:r>
-              <a:rPr lang="en-US" sz="3400" dirty="0" smtClean="0"/>
-              <a:t>preferred.</a:t>
-            </a:r>
-            <a:r>
-              <a:rPr lang="en-US" sz="3400" dirty="0" smtClean="0"/>
-              <a:t> </a:t>
-            </a:r>
-            <a:r>
-              <a:rPr lang="en-US" sz="3400" dirty="0" smtClean="0"/>
-              <a:t>Visualization Python is better</a:t>
+              <a:t> does not have great support for ML libraries example NLP, Python is preferred. Visualization Python is better</a:t>
             </a:r>
           </a:p>
           <a:p>
@@ -6623,11 +6383,7 @@
             </a:r>
             <a:r>
               <a:rPr lang="en-US" sz="3400" dirty="0" smtClean="0"/>
-              <a:t> </a:t>
-            </a:r>
-            <a:r>
-              <a:rPr lang="en-US" sz="3400" dirty="0" smtClean="0"/>
-              <a:t>is a statically typed language which allows us to find compile time errors. whereas Python is a dynamically typed language. Python language is highly prone to bugs every time you make changes to the existing code. Hence refactoring the code for </a:t>
+              <a:t> is a statically typed language which allows us to find compile time errors. whereas Python is a dynamically typed language. Python language is highly prone to bugs every time you make changes to the existing code. Hence refactoring the code for </a:t>
             </a:r>
             <a:r>
               <a:rPr lang="en-US" sz="3400" dirty="0" err="1" smtClean="0"/>
@@ -6654,7 +6410,6 @@
               <a:rPr lang="en-US" sz="3400" dirty="0" smtClean="0"/>
               <a:t> might be beneficial to get more speed, and dealing with Apache Spark directly</a:t>
             </a:r>
-            <a:endParaRPr lang="en-US" sz="3400" dirty="0" smtClean="0"/>
           </a:p>
           <a:p>
             <a:endParaRPr lang="en-US" dirty="0" smtClean="0"/>
@@ -8069,13 +7824,8 @@
             <a:pPr lvl="1"/>
             <a:r>
               <a:rPr lang="en-US" dirty="0" smtClean="0"/>
-              <a:t>Generative </a:t>
-            </a:r>
-            <a:r>
-              <a:rPr lang="en-US" dirty="0" smtClean="0"/>
-              <a:t>adversarial network (GAN) </a:t>
-            </a:r>
-            <a:endParaRPr lang="en-US" dirty="0" smtClean="0"/>
+              <a:t>Generative adversarial network (GAN) </a:t>
+            </a:r>
           </a:p>
           <a:p>
             <a:pPr lvl="1"/>
@@ -8096,13 +7846,7 @@
               <a:rPr lang="en-US" dirty="0" smtClean="0">
                 <a:hlinkClick r:id="rId3"/>
               </a:rPr>
-              <a:t>https</a:t>
-            </a:r>
-            <a:r>
-              <a:rPr lang="en-US" dirty="0" smtClean="0">
-                <a:hlinkClick r:id="rId3"/>
-              </a:rPr>
-              <a:t>://medium.mybridge.co/amazing-machine-learning-open-source-tools-projects-of-the-year-v-2019-95d772e4e985</a:t>
+              <a:t>https://medium.mybridge.co/amazing-machine-learning-open-source-tools-projects-of-the-year-v-2019-95d772e4e985</a:t>
             </a:r>
             <a:endParaRPr lang="en-US" dirty="0" smtClean="0"/>
           </a:p>
@@ -8306,11 +8050,7 @@
             </a:pPr>
             <a:r>
               <a:rPr lang="en-GB" sz="1200" dirty="0" smtClean="0"/>
-              <a:t> </a:t>
-            </a:r>
-            <a:r>
-              <a:rPr lang="en-GB" sz="1200" dirty="0" smtClean="0"/>
-              <a:t>Measure developers interest in major data science libraries</a:t>
+              <a:t> Measure developers interest in major data science libraries</a:t>
             </a:r>
           </a:p>
           <a:p>
@@ -8340,11 +8080,7 @@
             </a:pPr>
             <a:r>
               <a:rPr lang="en-GB" sz="1200" dirty="0" smtClean="0"/>
-              <a:t> </a:t>
-            </a:r>
-            <a:r>
-              <a:rPr lang="en-GB" sz="1200" dirty="0" smtClean="0"/>
-              <a:t>Stars: # of bookmarkers</a:t>
+              <a:t> Stars: # of bookmarkers</a:t>
             </a:r>
           </a:p>
           <a:p>
@@ -8354,11 +8090,7 @@
             </a:pPr>
             <a:r>
               <a:rPr lang="en-GB" sz="1200" dirty="0" smtClean="0"/>
-              <a:t> </a:t>
-            </a:r>
-            <a:r>
-              <a:rPr lang="en-GB" sz="1200" dirty="0" smtClean="0"/>
-              <a:t>Watchers: #  of people in change message list</a:t>
+              <a:t> Watchers: #  of people in change message list</a:t>
             </a:r>
           </a:p>
           <a:p>
@@ -8368,11 +8100,7 @@
             </a:pPr>
             <a:r>
               <a:rPr lang="en-GB" sz="1200" dirty="0" smtClean="0"/>
-              <a:t> </a:t>
-            </a:r>
-            <a:r>
-              <a:rPr lang="en-GB" sz="1200" dirty="0" smtClean="0"/>
-              <a:t>Clear domination of python, with emphasize in NN.  </a:t>
+              <a:t> Clear domination of python, with emphasize in NN.  </a:t>
             </a:r>
           </a:p>
           <a:p>
@@ -8382,11 +8110,7 @@
             </a:pPr>
             <a:r>
               <a:rPr lang="en-GB" sz="1200" dirty="0" smtClean="0"/>
-              <a:t> </a:t>
-            </a:r>
-            <a:r>
-              <a:rPr lang="en-GB" sz="1200" dirty="0" smtClean="0"/>
-              <a:t>This list is not an true indicator of usages, installation lists ; </a:t>
+              <a:t> This list is not an true indicator of usages, installation lists ; </a:t>
             </a:r>
             <a:r>
               <a:rPr lang="en-US" sz="1200" dirty="0" smtClean="0"/>
@@ -8398,11 +8122,7 @@
             </a:r>
             <a:r>
               <a:rPr lang="en-US" sz="1200" dirty="0" smtClean="0"/>
-              <a:t> load </a:t>
-            </a:r>
-            <a:r>
-              <a:rPr lang="en-US" sz="1200" dirty="0" smtClean="0"/>
-              <a:t>counts =&gt; vanity, </a:t>
+              <a:t> load counts =&gt; vanity, </a:t>
             </a:r>
             <a:r>
               <a:rPr lang="en-US" sz="1200" dirty="0" err="1" smtClean="0"/>
@@ -8410,15 +8130,7 @@
             </a:r>
             <a:r>
               <a:rPr lang="en-US" sz="1200" dirty="0" smtClean="0"/>
-              <a:t> </a:t>
-            </a:r>
-            <a:r>
-              <a:rPr lang="en-US" sz="1200" dirty="0" smtClean="0"/>
-              <a:t>downloads </a:t>
-            </a:r>
-            <a:r>
-              <a:rPr lang="en-US" sz="1200" dirty="0" smtClean="0"/>
-              <a:t>counts =&gt; </a:t>
+              <a:t> downloads counts =&gt; </a:t>
             </a:r>
             <a:r>
               <a:rPr lang="en-US" sz="1200" dirty="0" err="1" smtClean="0"/>
@@ -8436,7 +8148,6 @@
               <a:rPr lang="en-US" sz="1200" dirty="0" smtClean="0"/>
               <a:t>…</a:t>
             </a:r>
-            <a:endParaRPr lang="en-US" sz="1200" dirty="0" smtClean="0"/>
           </a:p>
           <a:p>
             <a:endParaRPr lang="en-GB" sz="1200" dirty="0" smtClean="0"/>
@@ -8467,11 +8178,7 @@
           <a:p>
             <a:r>
               <a:rPr lang="en-GB" sz="1100" dirty="0" smtClean="0"/>
-              <a:t>d</a:t>
-            </a:r>
-            <a:r>
-              <a:rPr lang="en-GB" sz="1100" dirty="0" smtClean="0"/>
-              <a:t>ata manipulation        machine learning          mathematics        visualizations</a:t>
+              <a:t>data manipulation        machine learning          mathematics        visualizations</a:t>
             </a:r>
             <a:endParaRPr lang="en-US" sz="1100" dirty="0"/>
           </a:p>
@@ -8659,11 +8366,7 @@
           <a:p>
             <a:r>
               <a:rPr lang="en-GB" sz="1100" dirty="0" smtClean="0"/>
-              <a:t>c</a:t>
-            </a:r>
-            <a:r>
-              <a:rPr lang="en-GB" sz="1100" dirty="0" smtClean="0"/>
-              <a:t>ommits          forks                      stars                  watchers</a:t>
+              <a:t>commits          forks                      stars                  watchers</a:t>
             </a:r>
             <a:endParaRPr lang="en-US" sz="1100" dirty="0"/>
           </a:p>
@@ -8693,11 +8396,7 @@
           <a:p>
             <a:r>
               <a:rPr lang="en-GB" sz="1100" dirty="0" smtClean="0"/>
-              <a:t>c</a:t>
-            </a:r>
-            <a:r>
-              <a:rPr lang="en-GB" sz="1100" dirty="0" smtClean="0"/>
-              <a:t>ommits          forks                      stars                  watchers</a:t>
+              <a:t>commits          forks                      stars                  watchers</a:t>
             </a:r>
             <a:endParaRPr lang="en-US" sz="1100" dirty="0"/>
           </a:p>
@@ -8815,11 +8514,7 @@
             </a:r>
             <a:r>
               <a:rPr lang="en-US" dirty="0" smtClean="0"/>
-              <a:t> </a:t>
-            </a:r>
-            <a:r>
-              <a:rPr lang="en-US" dirty="0" smtClean="0"/>
-              <a:t>(</a:t>
+              <a:t> (</a:t>
             </a:r>
             <a:r>
               <a:rPr lang="en-US" dirty="0" err="1" smtClean="0"/>
@@ -8827,41 +8522,13 @@
             </a:r>
             <a:r>
               <a:rPr lang="en-US" dirty="0" smtClean="0"/>
-              <a:t> like table with </a:t>
-            </a:r>
-            <a:r>
-              <a:rPr lang="en-US" dirty="0" smtClean="0"/>
-              <a:t>column </a:t>
-            </a:r>
-            <a:r>
-              <a:rPr lang="en-US" dirty="0" smtClean="0"/>
-              <a:t>names) </a:t>
-            </a:r>
-            <a:r>
-              <a:rPr lang="en-US" dirty="0" smtClean="0"/>
-              <a:t>can help a lot in keeping track of your data</a:t>
-            </a:r>
-            <a:r>
-              <a:rPr lang="en-US" dirty="0" smtClean="0"/>
-              <a:t>.</a:t>
-            </a:r>
-          </a:p>
-          <a:p>
-            <a:r>
-              <a:rPr lang="en-US" dirty="0" smtClean="0"/>
-              <a:t>Bad: hidden </a:t>
-            </a:r>
-            <a:r>
-              <a:rPr lang="en-US" dirty="0" smtClean="0"/>
-              <a:t>memory killers in the project, like the way that we use Python objects (like strings) for many internal details, so it's not unusual to see a dataset that is 5GB on disk take up 20GB or more in memory. It's an overall bad situation for large datasets</a:t>
-            </a:r>
-            <a:r>
-              <a:rPr lang="en-US" dirty="0" smtClean="0"/>
-              <a:t>.” Pandas </a:t>
-            </a:r>
-            <a:r>
-              <a:rPr lang="en-US" dirty="0" smtClean="0"/>
-              <a:t>rule of thumb: Wes </a:t>
+              <a:t> like table with column names) can help a lot in keeping track of your data.</a:t>
+            </a:r>
+          </a:p>
+          <a:p>
+            <a:r>
+              <a:rPr lang="en-US" dirty="0" smtClean="0"/>
+              <a:t>Bad: hidden memory killers in the project, like the way that we use Python objects (like strings) for many internal details, so it's not unusual to see a dataset that is 5GB on disk take up 20GB or more in memory. It's an overall bad situation for large datasets.” Pandas rule of thumb: Wes </a:t>
             </a:r>
             <a:r>
               <a:rPr lang="en-US" dirty="0" err="1" smtClean="0"/>
@@ -8869,22 +8536,14 @@
             </a:r>
             <a:r>
               <a:rPr lang="en-US" dirty="0" smtClean="0"/>
-              <a:t>  "have 5 to 10 times as much RAM as the size of your </a:t>
-            </a:r>
-            <a:r>
-              <a:rPr lang="en-US" dirty="0" smtClean="0"/>
-              <a:t>dataset“</a:t>
+              <a:t>  "have 5 to 10 times as much RAM as the size of your dataset“</a:t>
             </a:r>
           </a:p>
           <a:p>
             <a:pPr lvl="1"/>
             <a:r>
               <a:rPr lang="en-US" dirty="0" smtClean="0"/>
-              <a:t>an </a:t>
-            </a:r>
-            <a:r>
-              <a:rPr lang="en-US" dirty="0" smtClean="0"/>
-              <a:t>array of strings is an array of </a:t>
+              <a:t>an array of strings is an array of </a:t>
             </a:r>
             <a:r>
               <a:rPr lang="en-US" dirty="0" err="1" smtClean="0"/>
@@ -8924,52 +8583,28 @@
             </a:r>
             <a:r>
               <a:rPr lang="en-US" dirty="0" smtClean="0"/>
-              <a:t>' occupies 52 bytes of memory. '' occupies 49 bytes</a:t>
-            </a:r>
-            <a:r>
-              <a:rPr lang="en-US" dirty="0" smtClean="0"/>
-              <a:t>.</a:t>
+              <a:t>' occupies 52 bytes of memory. '' occupies 49 bytes.</a:t>
             </a:r>
           </a:p>
           <a:p>
             <a:pPr lvl="1"/>
             <a:r>
               <a:rPr lang="en-US" dirty="0" smtClean="0"/>
-              <a:t>pandas </a:t>
-            </a:r>
-            <a:r>
-              <a:rPr lang="en-US" dirty="0" smtClean="0"/>
-              <a:t>is the requirement that data must be loaded completely into RAM to be processed. No memory </a:t>
-            </a:r>
-            <a:r>
-              <a:rPr lang="en-US" dirty="0" smtClean="0"/>
-              <a:t>mapping</a:t>
+              <a:t>pandas is the requirement that data must be loaded completely into RAM to be processed. No memory mapping</a:t>
             </a:r>
           </a:p>
           <a:p>
             <a:pPr lvl="1"/>
             <a:r>
               <a:rPr lang="en-US" dirty="0" smtClean="0"/>
-              <a:t>missing data (NULL) </a:t>
-            </a:r>
-            <a:r>
-              <a:rPr lang="en-US" dirty="0" smtClean="0"/>
-              <a:t>storage is not </a:t>
-            </a:r>
-            <a:r>
-              <a:rPr lang="en-US" dirty="0" smtClean="0"/>
-              <a:t>explicit</a:t>
+              <a:t>missing data (NULL) storage is not explicit</a:t>
             </a:r>
           </a:p>
           <a:p>
             <a:pPr lvl="1"/>
             <a:r>
               <a:rPr lang="en-US" dirty="0" smtClean="0"/>
-              <a:t>In </a:t>
-            </a:r>
-            <a:r>
-              <a:rPr lang="en-US" dirty="0" smtClean="0"/>
-              <a:t>pandas, all memory is owned either by </a:t>
+              <a:t>In pandas, all memory is owned either by </a:t>
             </a:r>
             <a:r>
               <a:rPr lang="en-US" dirty="0" err="1" smtClean="0"/>
@@ -9005,11 +8640,7 @@
             <a:pPr lvl="1"/>
             <a:r>
               <a:rPr lang="en-US" dirty="0" smtClean="0"/>
-              <a:t>Pandas </a:t>
-            </a:r>
-            <a:r>
-              <a:rPr lang="en-US" dirty="0" smtClean="0"/>
-              <a:t>query planning is series of temporary tables </a:t>
+              <a:t>Pandas query planning is series of temporary tables </a:t>
             </a:r>
             <a:r>
               <a:rPr lang="en-US" dirty="0" err="1" smtClean="0"/>
@@ -9057,11 +8688,7 @@
             </a:r>
             <a:r>
               <a:rPr lang="en-US" dirty="0" smtClean="0"/>
-              <a:t> &lt; 0</a:t>
-            </a:r>
-            <a:r>
-              <a:rPr lang="en-US" dirty="0" smtClean="0"/>
-              <a:t>], not efficient…</a:t>
+              <a:t> &lt; 0], not efficient…</a:t>
             </a:r>
           </a:p>
           <a:p>
@@ -9184,11 +8811,7 @@
           <a:p>
             <a:r>
               <a:rPr lang="en-US" dirty="0" smtClean="0"/>
-              <a:t>minimal </a:t>
-            </a:r>
-            <a:r>
-              <a:rPr lang="en-US" dirty="0" smtClean="0"/>
-              <a:t>code changes you can run the code in parallel taking advantage of the processing power</a:t>
+              <a:t>minimal code changes you can run the code in parallel taking advantage of the processing power</a:t>
             </a:r>
             <a:br>
               <a:rPr lang="en-US" dirty="0" smtClean="0"/>
@@ -9408,11 +9031,7 @@
             </a:r>
             <a:r>
               <a:rPr lang="en-US" sz="1400" i="1" dirty="0" smtClean="0"/>
-              <a:t> </a:t>
-            </a:r>
-            <a:r>
-              <a:rPr lang="en-US" sz="1400" i="1" dirty="0" smtClean="0"/>
-              <a:t>= </a:t>
+              <a:t> = </a:t>
             </a:r>
             <a:r>
               <a:rPr lang="en-US" sz="1400" i="1" dirty="0" err="1" smtClean="0"/>
@@ -9522,49 +9141,25 @@
           <a:p>
             <a:r>
               <a:rPr lang="en-US" dirty="0" smtClean="0"/>
-              <a:t>It is widely used for fast aggregation of large datasets, low latency add/update/remove of columns, quicker ordered joins, and a fast file </a:t>
-            </a:r>
-            <a:r>
-              <a:rPr lang="en-US" dirty="0" smtClean="0"/>
-              <a:t>reader</a:t>
-            </a:r>
-          </a:p>
-          <a:p>
-            <a:r>
-              <a:rPr lang="en-US" dirty="0" smtClean="0"/>
-              <a:t>fast </a:t>
-            </a:r>
-            <a:r>
-              <a:rPr lang="en-US" dirty="0" smtClean="0"/>
-              <a:t>primary ordered indexing and its automatic secondary </a:t>
-            </a:r>
-            <a:r>
-              <a:rPr lang="en-US" dirty="0" smtClean="0"/>
-              <a:t>indexing</a:t>
-            </a:r>
-          </a:p>
-          <a:p>
-            <a:r>
-              <a:rPr lang="en-US" dirty="0" smtClean="0"/>
-              <a:t>a </a:t>
-            </a:r>
-            <a:r>
-              <a:rPr lang="en-US" dirty="0" smtClean="0"/>
-              <a:t>memory efficient combined join and group by</a:t>
-            </a:r>
-            <a:r>
-              <a:rPr lang="en-US" dirty="0" smtClean="0"/>
-              <a:t>.</a:t>
-            </a:r>
-          </a:p>
-          <a:p>
-            <a:r>
-              <a:rPr lang="en-US" dirty="0" smtClean="0"/>
-              <a:t>in </a:t>
-            </a:r>
-            <a:r>
-              <a:rPr lang="en-US" dirty="0" smtClean="0"/>
-              <a:t>addition to standard </a:t>
+              <a:t>It is widely used for fast aggregation of large datasets, low latency add/update/remove of columns, quicker ordered joins, and a fast file reader</a:t>
+            </a:r>
+          </a:p>
+          <a:p>
+            <a:r>
+              <a:rPr lang="en-US" dirty="0" smtClean="0"/>
+              <a:t>fast primary ordered indexing and its automatic secondary indexing</a:t>
+            </a:r>
+          </a:p>
+          <a:p>
+            <a:r>
+              <a:rPr lang="en-US" dirty="0" smtClean="0"/>
+              <a:t>a memory efficient combined join and group by.</a:t>
+            </a:r>
+          </a:p>
+          <a:p>
+            <a:r>
+              <a:rPr lang="en-US" dirty="0" smtClean="0"/>
+              <a:t>in addition to standard </a:t>
             </a:r>
             <a:r>
               <a:rPr lang="en-US" dirty="0" err="1" smtClean="0"/>
@@ -9602,7 +9197,6 @@
               <a:rPr lang="en-US" sz="2100" dirty="0" smtClean="0"/>
               <a:t>For example: &gt; </a:t>
             </a:r>
-            <a:endParaRPr lang="en-US" sz="2100" dirty="0" smtClean="0"/>
           </a:p>
           <a:p>
             <a:pPr>
@@ -9614,11 +9208,7 @@
             </a:r>
             <a:r>
               <a:rPr lang="en-US" sz="2100" i="1" dirty="0" smtClean="0"/>
-              <a:t>DT</a:t>
-            </a:r>
-            <a:r>
-              <a:rPr lang="en-US" sz="2100" i="1" dirty="0" smtClean="0"/>
-              <a:t>[,sum(v),by=x]</a:t>
+              <a:t>DT[,sum(v),by=x]</a:t>
             </a:r>
             <a:br>
               <a:rPr lang="en-US" sz="2100" i="1" dirty="0" smtClean="0"/>
@@ -9672,11 +9262,7 @@
             </a:r>
             <a:r>
               <a:rPr lang="en-US" sz="2100" dirty="0" smtClean="0"/>
-              <a:t>Joins </a:t>
-            </a:r>
-            <a:r>
-              <a:rPr lang="en-US" sz="2100" dirty="0" smtClean="0"/>
-              <a:t>X to DT (right join X to DT)</a:t>
+              <a:t>Joins X to DT (right join X to DT)</a:t>
             </a:r>
             <a:br>
               <a:rPr lang="en-US" sz="2100" dirty="0" smtClean="0"/>
@@ -9691,19 +9277,11 @@
             </a:r>
             <a:r>
               <a:rPr lang="en-US" sz="2100" i="1" dirty="0" smtClean="0"/>
-              <a:t>)] </a:t>
-            </a:r>
-            <a:r>
-              <a:rPr lang="en-US" sz="2100" i="1" dirty="0" smtClean="0"/>
-              <a:t>  </a:t>
+              <a:t>)]   </a:t>
             </a:r>
             <a:r>
               <a:rPr lang="en-US" sz="2100" dirty="0" smtClean="0"/>
-              <a:t>Joins </a:t>
-            </a:r>
-            <a:r>
-              <a:rPr lang="en-US" sz="2100" dirty="0" smtClean="0"/>
-              <a:t>X to DT (right join X to DT) on column x and </a:t>
+              <a:t>Joins X to DT (right join X to DT) on column x and </a:t>
             </a:r>
             <a:r>
               <a:rPr lang="en-US" sz="2100" dirty="0" err="1" smtClean="0"/>
@@ -9825,13 +9403,7 @@
               <a:rPr lang="en-US" dirty="0" smtClean="0">
                 <a:hlinkClick r:id="rId2"/>
               </a:rPr>
-              <a:t>https://h2oai.github.io/db-benchmark</a:t>
-            </a:r>
-            <a:r>
-              <a:rPr lang="en-US" dirty="0" smtClean="0">
-                <a:hlinkClick r:id="rId2"/>
-              </a:rPr>
-              <a:t>/</a:t>
+              <a:t>https://h2oai.github.io/db-benchmark/</a:t>
             </a:r>
             <a:endParaRPr lang="en-US" dirty="0" smtClean="0"/>
           </a:p>
@@ -9842,15 +9414,7 @@
             </a:r>
             <a:r>
               <a:rPr lang="en-US" dirty="0" smtClean="0"/>
-              <a:t> task benchmark for various </a:t>
-            </a:r>
-            <a:r>
-              <a:rPr lang="en-US" dirty="0" smtClean="0"/>
-              <a:t>data sizes </a:t>
-            </a:r>
-            <a:r>
-              <a:rPr lang="en-US" dirty="0" smtClean="0"/>
-              <a:t>and various data </a:t>
+              <a:t> task benchmark for various data sizes and various data </a:t>
             </a:r>
             <a:r>
               <a:rPr lang="en-US" dirty="0" err="1" smtClean="0"/>
@@ -9858,11 +9422,7 @@
             </a:r>
             <a:r>
               <a:rPr lang="en-US" dirty="0" smtClean="0"/>
-              <a:t> (cardinality, percentage of missing values, pre-sorted input). There are 10 different questions run for each input data, questions are categorized into two </a:t>
-            </a:r>
-            <a:r>
-              <a:rPr lang="en-US" dirty="0" smtClean="0"/>
-              <a:t>groups</a:t>
+              <a:t> (cardinality, percentage of missing values, pre-sorted input). There are 10 different questions run for each input data, questions are categorized into two groups</a:t>
             </a:r>
           </a:p>
           <a:p>
@@ -10052,21 +9612,13 @@
           <a:p>
             <a:r>
               <a:rPr lang="en-US" dirty="0" smtClean="0"/>
-              <a:t>ggplot2 is based on the grammar of </a:t>
-            </a:r>
-            <a:r>
-              <a:rPr lang="en-US" dirty="0" smtClean="0"/>
-              <a:t>graphics</a:t>
-            </a:r>
-          </a:p>
-          <a:p>
-            <a:r>
-              <a:rPr lang="en-US" dirty="0" smtClean="0"/>
-              <a:t>the </a:t>
-            </a:r>
-            <a:r>
-              <a:rPr lang="en-US" dirty="0" smtClean="0"/>
-              <a:t>idea that you can build every graph from the same few components: a data set, a set of </a:t>
+              <a:t>ggplot2 is based on the grammar of graphics</a:t>
+            </a:r>
+          </a:p>
+          <a:p>
+            <a:r>
+              <a:rPr lang="en-US" dirty="0" smtClean="0"/>
+              <a:t>the idea that you can build every graph from the same few components: a data set, a set of </a:t>
             </a:r>
             <a:r>
               <a:rPr lang="en-US" dirty="0" err="1" smtClean="0"/>

</xml_diff>